<commit_message>
Revert "Update in sample.pptx"
This reverts commit d1ab8851660e4d92f153d163d248bff134309f0e.
</commit_message>
<xml_diff>
--- a/in sample.pptx
+++ b/in sample.pptx
@@ -105,11 +105,6 @@
       </a:defRPr>
     </a:lvl9pPr>
   </p:defaultTextStyle>
-  <p:extLst>
-    <p:ext uri="{EFAFB233-063F-42B5-8137-9DF3F51BA10A}">
-      <p15:sldGuideLst xmlns:p15="http://schemas.microsoft.com/office/powerpoint/2012/main"/>
-    </p:ext>
-  </p:extLst>
 </p:presentation>
 </file>
 
@@ -260,7 +255,7 @@
           <a:p>
             <a:fld id="{6713A6CF-FF9B-4AD6-9343-043A00C820E6}" type="datetimeFigureOut">
               <a:rPr lang="zh-TW" altLang="en-US" smtClean="0"/>
-              <a:t>2019/12/11</a:t>
+              <a:t>2019/5/8</a:t>
             </a:fld>
             <a:endParaRPr lang="zh-TW" altLang="en-US"/>
           </a:p>
@@ -458,7 +453,7 @@
           <a:p>
             <a:fld id="{6713A6CF-FF9B-4AD6-9343-043A00C820E6}" type="datetimeFigureOut">
               <a:rPr lang="zh-TW" altLang="en-US" smtClean="0"/>
-              <a:t>2019/12/11</a:t>
+              <a:t>2019/5/8</a:t>
             </a:fld>
             <a:endParaRPr lang="zh-TW" altLang="en-US"/>
           </a:p>
@@ -666,7 +661,7 @@
           <a:p>
             <a:fld id="{6713A6CF-FF9B-4AD6-9343-043A00C820E6}" type="datetimeFigureOut">
               <a:rPr lang="zh-TW" altLang="en-US" smtClean="0"/>
-              <a:t>2019/12/11</a:t>
+              <a:t>2019/5/8</a:t>
             </a:fld>
             <a:endParaRPr lang="zh-TW" altLang="en-US"/>
           </a:p>
@@ -864,7 +859,7 @@
           <a:p>
             <a:fld id="{6713A6CF-FF9B-4AD6-9343-043A00C820E6}" type="datetimeFigureOut">
               <a:rPr lang="zh-TW" altLang="en-US" smtClean="0"/>
-              <a:t>2019/12/11</a:t>
+              <a:t>2019/5/8</a:t>
             </a:fld>
             <a:endParaRPr lang="zh-TW" altLang="en-US"/>
           </a:p>
@@ -1139,7 +1134,7 @@
           <a:p>
             <a:fld id="{6713A6CF-FF9B-4AD6-9343-043A00C820E6}" type="datetimeFigureOut">
               <a:rPr lang="zh-TW" altLang="en-US" smtClean="0"/>
-              <a:t>2019/12/11</a:t>
+              <a:t>2019/5/8</a:t>
             </a:fld>
             <a:endParaRPr lang="zh-TW" altLang="en-US"/>
           </a:p>
@@ -1404,7 +1399,7 @@
           <a:p>
             <a:fld id="{6713A6CF-FF9B-4AD6-9343-043A00C820E6}" type="datetimeFigureOut">
               <a:rPr lang="zh-TW" altLang="en-US" smtClean="0"/>
-              <a:t>2019/12/11</a:t>
+              <a:t>2019/5/8</a:t>
             </a:fld>
             <a:endParaRPr lang="zh-TW" altLang="en-US"/>
           </a:p>
@@ -1816,7 +1811,7 @@
           <a:p>
             <a:fld id="{6713A6CF-FF9B-4AD6-9343-043A00C820E6}" type="datetimeFigureOut">
               <a:rPr lang="zh-TW" altLang="en-US" smtClean="0"/>
-              <a:t>2019/12/11</a:t>
+              <a:t>2019/5/8</a:t>
             </a:fld>
             <a:endParaRPr lang="zh-TW" altLang="en-US"/>
           </a:p>
@@ -1957,7 +1952,7 @@
           <a:p>
             <a:fld id="{6713A6CF-FF9B-4AD6-9343-043A00C820E6}" type="datetimeFigureOut">
               <a:rPr lang="zh-TW" altLang="en-US" smtClean="0"/>
-              <a:t>2019/12/11</a:t>
+              <a:t>2019/5/8</a:t>
             </a:fld>
             <a:endParaRPr lang="zh-TW" altLang="en-US"/>
           </a:p>
@@ -2070,7 +2065,7 @@
           <a:p>
             <a:fld id="{6713A6CF-FF9B-4AD6-9343-043A00C820E6}" type="datetimeFigureOut">
               <a:rPr lang="zh-TW" altLang="en-US" smtClean="0"/>
-              <a:t>2019/12/11</a:t>
+              <a:t>2019/5/8</a:t>
             </a:fld>
             <a:endParaRPr lang="zh-TW" altLang="en-US"/>
           </a:p>
@@ -2381,7 +2376,7 @@
           <a:p>
             <a:fld id="{6713A6CF-FF9B-4AD6-9343-043A00C820E6}" type="datetimeFigureOut">
               <a:rPr lang="zh-TW" altLang="en-US" smtClean="0"/>
-              <a:t>2019/12/11</a:t>
+              <a:t>2019/5/8</a:t>
             </a:fld>
             <a:endParaRPr lang="zh-TW" altLang="en-US"/>
           </a:p>
@@ -2669,7 +2664,7 @@
           <a:p>
             <a:fld id="{6713A6CF-FF9B-4AD6-9343-043A00C820E6}" type="datetimeFigureOut">
               <a:rPr lang="zh-TW" altLang="en-US" smtClean="0"/>
-              <a:t>2019/12/11</a:t>
+              <a:t>2019/5/8</a:t>
             </a:fld>
             <a:endParaRPr lang="zh-TW" altLang="en-US"/>
           </a:p>
@@ -2910,7 +2905,7 @@
           <a:p>
             <a:fld id="{6713A6CF-FF9B-4AD6-9343-043A00C820E6}" type="datetimeFigureOut">
               <a:rPr lang="zh-TW" altLang="en-US" smtClean="0"/>
-              <a:t>2019/12/11</a:t>
+              <a:t>2019/5/8</a:t>
             </a:fld>
             <a:endParaRPr lang="zh-TW" altLang="en-US"/>
           </a:p>
@@ -3348,10 +3343,6 @@
           <a:bodyPr/>
           <a:lstStyle/>
           <a:p>
-            <a:r>
-              <a:rPr lang="en-US" altLang="zh-TW"/>
-              <a:t>C8 c8 c8 </a:t>
-            </a:r>
             <a:endParaRPr lang="zh-TW" altLang="en-US"/>
           </a:p>
         </p:txBody>
@@ -4124,8 +4115,8 @@
             </a:p>
           </p:txBody>
         </p:sp>
-        <mc:AlternateContent xmlns:mc="http://schemas.openxmlformats.org/markup-compatibility/2006" xmlns:a14="http://schemas.microsoft.com/office/drawing/2010/main">
-          <mc:Choice Requires="a14">
+        <mc:AlternateContent xmlns:mc="http://schemas.openxmlformats.org/markup-compatibility/2006">
+          <mc:Choice xmlns:a14="http://schemas.microsoft.com/office/drawing/2010/main" Requires="a14">
             <p:sp>
               <p:nvSpPr>
                 <p:cNvPr id="2048" name="文字方塊 2047">
@@ -4156,7 +4147,6 @@
                 </a:bodyPr>
                 <a:lstStyle/>
                 <a:p>
-                  <a:pPr/>
                   <a14:m>
                     <m:oMathPara xmlns:m="http://schemas.openxmlformats.org/officeDocument/2006/math">
                       <m:oMathParaPr>
@@ -4166,7 +4156,7 @@
                         <m:sSubSup>
                           <m:sSubSupPr>
                             <m:ctrlPr>
-                              <a:rPr lang="zh-TW" altLang="en-US" sz="2400" i="1">
+                              <a:rPr lang="zh-TW" altLang="en-US" sz="2400">
                                 <a:latin typeface="Cambria Math" panose="02040503050406030204" pitchFamily="18" charset="0"/>
                               </a:rPr>
                             </m:ctrlPr>
@@ -4204,7 +4194,7 @@
               </p:txBody>
             </p:sp>
           </mc:Choice>
-          <mc:Fallback xmlns="">
+          <mc:Fallback>
             <p:sp>
               <p:nvSpPr>
                 <p:cNvPr id="2048" name="文字方塊 2047">
@@ -5329,8 +5319,8 @@
             </a:p>
           </p:txBody>
         </p:sp>
-        <mc:AlternateContent xmlns:mc="http://schemas.openxmlformats.org/markup-compatibility/2006" xmlns:a14="http://schemas.microsoft.com/office/drawing/2010/main">
-          <mc:Choice Requires="a14">
+        <mc:AlternateContent xmlns:mc="http://schemas.openxmlformats.org/markup-compatibility/2006">
+          <mc:Choice xmlns:a14="http://schemas.microsoft.com/office/drawing/2010/main" Requires="a14">
             <p:sp>
               <p:nvSpPr>
                 <p:cNvPr id="60" name="文字方塊 59">
@@ -5361,7 +5351,6 @@
                 </a:bodyPr>
                 <a:lstStyle/>
                 <a:p>
-                  <a:pPr/>
                   <a14:m>
                     <m:oMathPara xmlns:m="http://schemas.openxmlformats.org/officeDocument/2006/math">
                       <m:oMathParaPr>
@@ -5371,7 +5360,7 @@
                         <m:sSubSup>
                           <m:sSubSupPr>
                             <m:ctrlPr>
-                              <a:rPr lang="zh-TW" altLang="en-US" sz="2400" i="1">
+                              <a:rPr lang="zh-TW" altLang="en-US" sz="2400">
                                 <a:latin typeface="Cambria Math" panose="02040503050406030204" pitchFamily="18" charset="0"/>
                               </a:rPr>
                             </m:ctrlPr>
@@ -5409,7 +5398,7 @@
               </p:txBody>
             </p:sp>
           </mc:Choice>
-          <mc:Fallback xmlns="">
+          <mc:Fallback>
             <p:sp>
               <p:nvSpPr>
                 <p:cNvPr id="60" name="文字方塊 59">

</xml_diff>